<commit_message>
Atualização de arquivo Office
</commit_message>
<xml_diff>
--- a/Sprint1/Arquivos-Office-Sprint1/Coffee Health - Apresentacao.pptx
+++ b/Sprint1/Arquivos-Office-Sprint1/Coffee Health - Apresentacao.pptx
@@ -134,6 +134,35 @@
     </p:ext>
   </p:extLst>
 </p:presentation>
+</file>
+
+<file path=ppt/changesInfos/changesInfo1.xml><?xml version="1.0" encoding="utf-8"?>
+<pc:chgInfo xmlns:a="http://schemas.openxmlformats.org/drawingml/2006/main" xmlns:r="http://schemas.openxmlformats.org/officeDocument/2006/relationships" xmlns:ac="http://schemas.microsoft.com/office/drawing/2013/main/command" xmlns:pc="http://schemas.microsoft.com/office/powerpoint/2013/main/command">
+  <pc:docChgLst>
+    <pc:chgData name="Diego Vieira" userId="b6b7b548fc3bdae4" providerId="LiveId" clId="{AA0CB821-EAA7-451F-BCE2-605AADE4D64D}"/>
+    <pc:docChg chg="modSld">
+      <pc:chgData name="Diego Vieira" userId="b6b7b548fc3bdae4" providerId="LiveId" clId="{AA0CB821-EAA7-451F-BCE2-605AADE4D64D}" dt="2022-09-07T22:49:46.137" v="3" actId="1076"/>
+      <pc:docMkLst>
+        <pc:docMk/>
+      </pc:docMkLst>
+      <pc:sldChg chg="addSp modSp mod">
+        <pc:chgData name="Diego Vieira" userId="b6b7b548fc3bdae4" providerId="LiveId" clId="{AA0CB821-EAA7-451F-BCE2-605AADE4D64D}" dt="2022-09-07T22:49:46.137" v="3" actId="1076"/>
+        <pc:sldMkLst>
+          <pc:docMk/>
+          <pc:sldMk cId="3950066950" sldId="312"/>
+        </pc:sldMkLst>
+        <pc:picChg chg="add mod">
+          <ac:chgData name="Diego Vieira" userId="b6b7b548fc3bdae4" providerId="LiveId" clId="{AA0CB821-EAA7-451F-BCE2-605AADE4D64D}" dt="2022-09-07T22:49:46.137" v="3" actId="1076"/>
+          <ac:picMkLst>
+            <pc:docMk/>
+            <pc:sldMk cId="3950066950" sldId="312"/>
+            <ac:picMk id="4" creationId="{DE857894-D3A8-3DC9-C880-8F03392B33BC}"/>
+          </ac:picMkLst>
+        </pc:picChg>
+      </pc:sldChg>
+    </pc:docChg>
+  </pc:docChgLst>
+</pc:chgInfo>
 </file>
 
 <file path=ppt/handoutMasters/handoutMaster1.xml><?xml version="1.0" encoding="utf-8"?>
@@ -10102,6 +10131,36 @@
           <a:xfrm>
             <a:off x="499758" y="1855962"/>
             <a:ext cx="5419725" cy="4000500"/>
+          </a:xfrm>
+          <a:prstGeom prst="rect">
+            <a:avLst/>
+          </a:prstGeom>
+        </p:spPr>
+      </p:pic>
+      <p:pic>
+        <p:nvPicPr>
+          <p:cNvPr id="4" name="Imagem 3">
+            <a:extLst>
+              <a:ext uri="{FF2B5EF4-FFF2-40B4-BE49-F238E27FC236}">
+                <a16:creationId xmlns:a16="http://schemas.microsoft.com/office/drawing/2014/main" id="{DE857894-D3A8-3DC9-C880-8F03392B33BC}"/>
+              </a:ext>
+            </a:extLst>
+          </p:cNvPr>
+          <p:cNvPicPr>
+            <a:picLocks noChangeAspect="1"/>
+          </p:cNvPicPr>
+          <p:nvPr/>
+        </p:nvPicPr>
+        <p:blipFill>
+          <a:blip r:embed="rId4"/>
+          <a:stretch>
+            <a:fillRect/>
+          </a:stretch>
+        </p:blipFill>
+        <p:spPr>
+          <a:xfrm>
+            <a:off x="499758" y="1618317"/>
+            <a:ext cx="5596242" cy="4972050"/>
           </a:xfrm>
           <a:prstGeom prst="rect">
             <a:avLst/>
@@ -14564,15 +14623,6 @@
 </file>
 
 <file path=customXml/item1.xml><?xml version="1.0" encoding="utf-8"?>
-<?mso-contentType ?>
-<FormTemplates xmlns="http://schemas.microsoft.com/sharepoint/v3/contenttype/forms">
-  <Display>DocumentLibraryForm</Display>
-  <Edit>DocumentLibraryForm</Edit>
-  <New>DocumentLibraryForm</New>
-</FormTemplates>
-</file>
-
-<file path=customXml/item2.xml><?xml version="1.0" encoding="utf-8"?>
 <ct:contentTypeSchema xmlns:ct="http://schemas.microsoft.com/office/2006/metadata/contentType" xmlns:ma="http://schemas.microsoft.com/office/2006/metadata/properties/metaAttributes" ct:_="" ma:_="" ma:contentTypeName="Document" ma:contentTypeID="0x01010079F111ED35F8CC479449609E8A0923A6" ma:contentTypeVersion="18" ma:contentTypeDescription="Create a new document." ma:contentTypeScope="" ma:versionID="22a266b9fa9a230c5a512669d8b298c3">
   <xsd:schema xmlns:xsd="http://www.w3.org/2001/XMLSchema" xmlns:xs="http://www.w3.org/2001/XMLSchema" xmlns:p="http://schemas.microsoft.com/office/2006/metadata/properties" xmlns:ns1="http://schemas.microsoft.com/sharepoint/v3" xmlns:ns2="71af3243-3dd4-4a8d-8c0d-dd76da1f02a5" xmlns:ns3="16c05727-aa75-4e4a-9b5f-8a80a1165891" xmlns:ns4="230e9df3-be65-4c73-a93b-d1236ebd677e" targetNamespace="http://schemas.microsoft.com/office/2006/metadata/properties" ma:root="true" ma:fieldsID="eddc33fff6b14141ee5c74a0d29ea6a1" ns1:_="" ns2:_="" ns3:_="" ns4:_="">
     <xsd:import namespace="http://schemas.microsoft.com/sharepoint/v3"/>
@@ -14848,6 +14898,15 @@
 </ct:contentTypeSchema>
 </file>
 
+<file path=customXml/item2.xml><?xml version="1.0" encoding="utf-8"?>
+<?mso-contentType ?>
+<FormTemplates xmlns="http://schemas.microsoft.com/sharepoint/v3/contenttype/forms">
+  <Display>DocumentLibraryForm</Display>
+  <Edit>DocumentLibraryForm</Edit>
+  <New>DocumentLibraryForm</New>
+</FormTemplates>
+</file>
+
 <file path=customXml/item3.xml><?xml version="1.0" encoding="utf-8"?>
 <p:properties xmlns:p="http://schemas.microsoft.com/office/2006/metadata/properties" xmlns:xsi="http://www.w3.org/2001/XMLSchema-instance" xmlns:pc="http://schemas.microsoft.com/office/infopath/2007/PartnerControls">
   <documentManagement>
@@ -14868,14 +14927,6 @@
 </file>
 
 <file path=customXml/itemProps1.xml><?xml version="1.0" encoding="utf-8"?>
-<ds:datastoreItem xmlns:ds="http://schemas.openxmlformats.org/officeDocument/2006/customXml" ds:itemID="{09F7E09F-F817-4A99-A43E-1B7B2298E82F}">
-  <ds:schemaRefs>
-    <ds:schemaRef ds:uri="http://schemas.microsoft.com/sharepoint/v3/contenttype/forms"/>
-  </ds:schemaRefs>
-</ds:datastoreItem>
-</file>
-
-<file path=customXml/itemProps2.xml><?xml version="1.0" encoding="utf-8"?>
 <ds:datastoreItem xmlns:ds="http://schemas.openxmlformats.org/officeDocument/2006/customXml" ds:itemID="{A56FC496-221D-4D11-9DFD-2E47AEB2A196}">
   <ds:schemaRefs>
     <ds:schemaRef ds:uri="http://schemas.microsoft.com/office/2006/metadata/contentType"/>
@@ -14892,6 +14943,14 @@
     <ds:schemaRef ds:uri="http://purl.org/dc/elements/1.1/"/>
     <ds:schemaRef ds:uri="http://purl.org/dc/terms/"/>
     <ds:schemaRef ds:uri="http://schemas.microsoft.com/internal/obd"/>
+  </ds:schemaRefs>
+</ds:datastoreItem>
+</file>
+
+<file path=customXml/itemProps2.xml><?xml version="1.0" encoding="utf-8"?>
+<ds:datastoreItem xmlns:ds="http://schemas.openxmlformats.org/officeDocument/2006/customXml" ds:itemID="{09F7E09F-F817-4A99-A43E-1B7B2298E82F}">
+  <ds:schemaRefs>
+    <ds:schemaRef ds:uri="http://schemas.microsoft.com/sharepoint/v3/contenttype/forms"/>
   </ds:schemaRefs>
 </ds:datastoreItem>
 </file>

</xml_diff>